<commit_message>
Updated ppt and README
</commit_message>
<xml_diff>
--- a/IntroWorkshop/RBar_IntroI.pptx
+++ b/IntroWorkshop/RBar_IntroI.pptx
@@ -9156,7 +9156,7 @@
             <a:r>
               <a:rPr lang="en-US" sz="2300" b="0" dirty="0" err="1">
                 <a:solidFill>
-                  <a:srgbClr val="C00000"/>
+                  <a:srgbClr val="0070C0"/>
                 </a:solidFill>
                 <a:latin typeface="Lucida Sans Typewriter" panose="020B0509030504030204" pitchFamily="49" charset="0"/>
               </a:rPr>
@@ -9165,11 +9165,20 @@
             <a:r>
               <a:rPr lang="en-US" sz="2300" b="0" dirty="0">
                 <a:solidFill>
-                  <a:srgbClr val="C00000"/>
-                </a:solidFill>
-                <a:latin typeface="Lucida Sans Typewriter" panose="020B0509030504030204" pitchFamily="49" charset="0"/>
-              </a:rPr>
-              <a:t>(81))</a:t>
+                  <a:srgbClr val="0070C0"/>
+                </a:solidFill>
+                <a:latin typeface="Lucida Sans Typewriter" panose="020B0509030504030204" pitchFamily="49" charset="0"/>
+              </a:rPr>
+              <a:t>(81)</a:t>
+            </a:r>
+            <a:r>
+              <a:rPr lang="en-US" sz="2300" b="0" dirty="0">
+                <a:solidFill>
+                  <a:srgbClr val="C00000"/>
+                </a:solidFill>
+                <a:latin typeface="Lucida Sans Typewriter" panose="020B0509030504030204" pitchFamily="49" charset="0"/>
+              </a:rPr>
+              <a:t>)</a:t>
             </a:r>
           </a:p>
           <a:p>
@@ -9326,7 +9335,7 @@
             <a:r>
               <a:rPr lang="en-US" sz="2300" b="0" dirty="0" err="1">
                 <a:solidFill>
-                  <a:srgbClr val="C00000"/>
+                  <a:srgbClr val="0070C0"/>
                 </a:solidFill>
                 <a:latin typeface="Lucida Sans Typewriter" panose="020B0509030504030204" pitchFamily="49" charset="0"/>
               </a:rPr>
@@ -9335,11 +9344,20 @@
             <a:r>
               <a:rPr lang="en-US" sz="2300" b="0" dirty="0">
                 <a:solidFill>
-                  <a:srgbClr val="C00000"/>
-                </a:solidFill>
-                <a:latin typeface="Lucida Sans Typewriter" panose="020B0509030504030204" pitchFamily="49" charset="0"/>
-              </a:rPr>
-              <a:t>(81))</a:t>
+                  <a:srgbClr val="0070C0"/>
+                </a:solidFill>
+                <a:latin typeface="Lucida Sans Typewriter" panose="020B0509030504030204" pitchFamily="49" charset="0"/>
+              </a:rPr>
+              <a:t>(81)</a:t>
+            </a:r>
+            <a:r>
+              <a:rPr lang="en-US" sz="2300" b="0" dirty="0">
+                <a:solidFill>
+                  <a:srgbClr val="C00000"/>
+                </a:solidFill>
+                <a:latin typeface="Lucida Sans Typewriter" panose="020B0509030504030204" pitchFamily="49" charset="0"/>
+              </a:rPr>
+              <a:t>)</a:t>
             </a:r>
           </a:p>
           <a:p>
@@ -20248,21 +20266,10 @@
               <a:buChar char="q"/>
             </a:pPr>
             <a:r>
-              <a:rPr lang="en-US" dirty="0"/>
-              <a:t>RStudio </a:t>
-            </a:r>
-            <a:r>
-              <a:rPr lang="en-US" b="0" i="1" dirty="0"/>
-              <a:t>(never use </a:t>
-            </a:r>
-            <a:r>
-              <a:rPr lang="en-US" b="0" i="1" dirty="0" err="1"/>
-              <a:t>RGui</a:t>
-            </a:r>
-            <a:r>
-              <a:rPr lang="en-US" b="0" i="1" dirty="0"/>
-              <a:t> / command line again…)</a:t>
-            </a:r>
+              <a:rPr lang="en-US" dirty="0" err="1" smtClean="0"/>
+              <a:t>RStudio</a:t>
+            </a:r>
+            <a:endParaRPr lang="en-US" dirty="0"/>
           </a:p>
           <a:p>
             <a:pPr marL="457200" indent="-457200">
@@ -20270,8 +20277,12 @@
               <a:buChar char="q"/>
             </a:pPr>
             <a:r>
+              <a:rPr lang="en-US" dirty="0" smtClean="0"/>
+              <a:t>Learning </a:t>
+            </a:r>
+            <a:r>
               <a:rPr lang="en-US" dirty="0"/>
-              <a:t>Learning a new language – “R”</a:t>
+              <a:t>a new language – “R”</a:t>
             </a:r>
           </a:p>
           <a:p>

</xml_diff>

<commit_message>
Added Co-Working Sessions to README
</commit_message>
<xml_diff>
--- a/IntroWorkshop/RBar_IntroI.pptx
+++ b/IntroWorkshop/RBar_IntroI.pptx
@@ -14730,9 +14730,8 @@
             </a:r>
             <a:r>
               <a:rPr lang="en-CA" dirty="0" smtClean="0"/>
-              <a:t>github.com/DanielleQuinn/RBarMUN/IntroWorkshop</a:t>
-            </a:r>
-            <a:endParaRPr lang="en-CA" dirty="0"/>
+              <a:t>github.com/DanielleQuinn/RBarMUN</a:t>
+            </a:r>
           </a:p>
           <a:p>
             <a:pPr marL="1600200" lvl="2" indent="-457200">
@@ -14743,7 +14742,7 @@
               <a:buChar char="§"/>
             </a:pPr>
             <a:r>
-              <a:rPr lang="en-CA" dirty="0"/>
+              <a:rPr lang="en-CA" dirty="0" smtClean="0"/>
               <a:t>Complete .R script</a:t>
             </a:r>
           </a:p>
@@ -14756,8 +14755,12 @@
               <a:buChar char="§"/>
             </a:pPr>
             <a:r>
+              <a:rPr lang="en-CA" dirty="0" smtClean="0"/>
+              <a:t>Blank </a:t>
+            </a:r>
+            <a:r>
               <a:rPr lang="en-CA" dirty="0"/>
-              <a:t>Blank (code-along) .R script</a:t>
+              <a:t>(code-along) .R script</a:t>
             </a:r>
           </a:p>
           <a:p>

</xml_diff>